<commit_message>
Aula ajustes Python RAD 22maio2023
</commit_message>
<xml_diff>
--- a/01 Classes/Aula 10 RAD Python - Arquivos e JSON.pptx
+++ b/01 Classes/Aula 10 RAD Python - Arquivos e JSON.pptx
@@ -2318,7 +2318,7 @@
           <a:p>
             <a:fld id="{48A87A34-81AB-432B-8DAE-1953F412C126}" type="datetimeFigureOut">
               <a:rPr lang="en-US" smtClean="0"/>
-              <a:t>8/26/2022</a:t>
+              <a:t>5/22/2023</a:t>
             </a:fld>
             <a:endParaRPr lang="en-US" dirty="0"/>
           </a:p>
@@ -2529,7 +2529,7 @@
           <a:p>
             <a:fld id="{48A87A34-81AB-432B-8DAE-1953F412C126}" type="datetimeFigureOut">
               <a:rPr lang="en-US" smtClean="0"/>
-              <a:t>8/26/2022</a:t>
+              <a:t>5/22/2023</a:t>
             </a:fld>
             <a:endParaRPr lang="en-US" dirty="0"/>
           </a:p>
@@ -2744,7 +2744,7 @@
           <a:p>
             <a:fld id="{48A87A34-81AB-432B-8DAE-1953F412C126}" type="datetimeFigureOut">
               <a:rPr lang="en-US" smtClean="0"/>
-              <a:t>8/26/2022</a:t>
+              <a:t>5/22/2023</a:t>
             </a:fld>
             <a:endParaRPr lang="en-US" dirty="0"/>
           </a:p>
@@ -3112,7 +3112,7 @@
           <a:p>
             <a:fld id="{48A87A34-81AB-432B-8DAE-1953F412C126}" type="datetimeFigureOut">
               <a:rPr lang="en-US" smtClean="0"/>
-              <a:t>8/26/2022</a:t>
+              <a:t>5/22/2023</a:t>
             </a:fld>
             <a:endParaRPr lang="en-US" dirty="0"/>
           </a:p>
@@ -3391,7 +3391,7 @@
           <a:p>
             <a:fld id="{48A87A34-81AB-432B-8DAE-1953F412C126}" type="datetimeFigureOut">
               <a:rPr lang="en-US" smtClean="0"/>
-              <a:t>8/26/2022</a:t>
+              <a:t>5/22/2023</a:t>
             </a:fld>
             <a:endParaRPr lang="en-US" dirty="0"/>
           </a:p>
@@ -3659,7 +3659,7 @@
           <a:p>
             <a:fld id="{48A87A34-81AB-432B-8DAE-1953F412C126}" type="datetimeFigureOut">
               <a:rPr lang="en-US" smtClean="0"/>
-              <a:t>8/26/2022</a:t>
+              <a:t>5/22/2023</a:t>
             </a:fld>
             <a:endParaRPr lang="en-US" dirty="0"/>
           </a:p>
@@ -4075,7 +4075,7 @@
           <a:p>
             <a:fld id="{48A87A34-81AB-432B-8DAE-1953F412C126}" type="datetimeFigureOut">
               <a:rPr lang="en-US" smtClean="0"/>
-              <a:t>8/26/2022</a:t>
+              <a:t>5/22/2023</a:t>
             </a:fld>
             <a:endParaRPr lang="en-US" dirty="0"/>
           </a:p>
@@ -4224,7 +4224,7 @@
           <a:p>
             <a:fld id="{48A87A34-81AB-432B-8DAE-1953F412C126}" type="datetimeFigureOut">
               <a:rPr lang="en-US" smtClean="0"/>
-              <a:t>8/26/2022</a:t>
+              <a:t>5/22/2023</a:t>
             </a:fld>
             <a:endParaRPr lang="en-US" dirty="0"/>
           </a:p>
@@ -4350,7 +4350,7 @@
           <a:p>
             <a:fld id="{48A87A34-81AB-432B-8DAE-1953F412C126}" type="datetimeFigureOut">
               <a:rPr lang="en-US" smtClean="0"/>
-              <a:t>8/26/2022</a:t>
+              <a:t>5/22/2023</a:t>
             </a:fld>
             <a:endParaRPr lang="en-US" dirty="0"/>
           </a:p>
@@ -4601,7 +4601,7 @@
           <a:p>
             <a:fld id="{48A87A34-81AB-432B-8DAE-1953F412C126}" type="datetimeFigureOut">
               <a:rPr lang="en-US" smtClean="0"/>
-              <a:t>8/26/2022</a:t>
+              <a:t>5/22/2023</a:t>
             </a:fld>
             <a:endParaRPr lang="en-US" dirty="0"/>
           </a:p>
@@ -5047,7 +5047,7 @@
             <a:fld id="{48A87A34-81AB-432B-8DAE-1953F412C126}" type="datetimeFigureOut">
               <a:rPr lang="en-US" smtClean="0"/>
               <a:pPr/>
-              <a:t>8/26/2022</a:t>
+              <a:t>5/22/2023</a:t>
             </a:fld>
             <a:endParaRPr lang="en-US" dirty="0"/>
           </a:p>
@@ -5375,7 +5375,7 @@
             <a:fld id="{48A87A34-81AB-432B-8DAE-1953F412C126}" type="datetimeFigureOut">
               <a:rPr lang="en-US" smtClean="0"/>
               <a:pPr/>
-              <a:t>8/26/2022</a:t>
+              <a:t>5/22/2023</a:t>
             </a:fld>
             <a:endParaRPr lang="en-US" dirty="0"/>
           </a:p>
@@ -9881,7 +9881,7 @@
                 <a:latin typeface="Times New Roman" panose="02020603050405020304" pitchFamily="18" charset="0"/>
                 <a:cs typeface="Times New Roman" panose="02020603050405020304" pitchFamily="18" charset="0"/>
               </a:rPr>
-              <a:t> = 'utf-8’); // </a:t>
+              <a:t> = 'utf-8'); // </a:t>
             </a:r>
             <a:r>
               <a:rPr lang="en-US" sz="2400" b="1" dirty="0">
@@ -10324,7 +10324,7 @@
                 <a:latin typeface="Times New Roman" panose="02020603050405020304" pitchFamily="18" charset="0"/>
                 <a:cs typeface="Times New Roman" panose="02020603050405020304" pitchFamily="18" charset="0"/>
               </a:rPr>
-              <a:t>(“f://listaNiver.txt", “</a:t>
+              <a:t>("f://listaNiver.txt", "</a:t>
             </a:r>
             <a:r>
               <a:rPr lang="en-US" sz="2400" dirty="0" err="1">
@@ -10338,7 +10338,7 @@
                 <a:latin typeface="Times New Roman" panose="02020603050405020304" pitchFamily="18" charset="0"/>
                 <a:cs typeface="Times New Roman" panose="02020603050405020304" pitchFamily="18" charset="0"/>
               </a:rPr>
-              <a:t>”, </a:t>
+              <a:t>", </a:t>
             </a:r>
             <a:r>
               <a:rPr lang="en-US" sz="2400" b="1" dirty="0">
@@ -10352,7 +10352,7 @@
                 <a:latin typeface="Times New Roman" panose="02020603050405020304" pitchFamily="18" charset="0"/>
                 <a:cs typeface="Times New Roman" panose="02020603050405020304" pitchFamily="18" charset="0"/>
               </a:rPr>
-              <a:t> = '</a:t>
+              <a:t> = "</a:t>
             </a:r>
             <a:r>
               <a:rPr lang="en-US" sz="2400" b="1" dirty="0">
@@ -10369,7 +10369,7 @@
                 <a:latin typeface="Times New Roman" panose="02020603050405020304" pitchFamily="18" charset="0"/>
                 <a:cs typeface="Times New Roman" panose="02020603050405020304" pitchFamily="18" charset="0"/>
               </a:rPr>
-              <a:t>') as </a:t>
+              <a:t>") as </a:t>
             </a:r>
             <a:r>
               <a:rPr lang="en-US" sz="2400" b="1" dirty="0">
@@ -10409,7 +10409,21 @@
                 <a:latin typeface="Times New Roman" panose="02020603050405020304" pitchFamily="18" charset="0"/>
                 <a:cs typeface="Times New Roman" panose="02020603050405020304" pitchFamily="18" charset="0"/>
               </a:rPr>
-              <a:t>(“Julia\n");</a:t>
+              <a:t>("Julia</a:t>
+            </a:r>
+            <a:r>
+              <a:rPr lang="en-US" sz="2400" b="1" dirty="0">
+                <a:latin typeface="Times New Roman" panose="02020603050405020304" pitchFamily="18" charset="0"/>
+                <a:cs typeface="Times New Roman" panose="02020603050405020304" pitchFamily="18" charset="0"/>
+              </a:rPr>
+              <a:t>\n</a:t>
+            </a:r>
+            <a:r>
+              <a:rPr lang="en-US" sz="2400" dirty="0">
+                <a:latin typeface="Times New Roman" panose="02020603050405020304" pitchFamily="18" charset="0"/>
+                <a:cs typeface="Times New Roman" panose="02020603050405020304" pitchFamily="18" charset="0"/>
+              </a:rPr>
+              <a:t>");</a:t>
             </a:r>
           </a:p>
           <a:p>
@@ -10435,7 +10449,21 @@
                 <a:latin typeface="Times New Roman" panose="02020603050405020304" pitchFamily="18" charset="0"/>
                 <a:cs typeface="Times New Roman" panose="02020603050405020304" pitchFamily="18" charset="0"/>
               </a:rPr>
-              <a:t>(“Maria\n");</a:t>
+              <a:t>("Maria</a:t>
+            </a:r>
+            <a:r>
+              <a:rPr lang="en-US" sz="2400" b="1" dirty="0">
+                <a:latin typeface="Times New Roman" panose="02020603050405020304" pitchFamily="18" charset="0"/>
+                <a:cs typeface="Times New Roman" panose="02020603050405020304" pitchFamily="18" charset="0"/>
+              </a:rPr>
+              <a:t>\n</a:t>
+            </a:r>
+            <a:r>
+              <a:rPr lang="en-US" sz="2400" dirty="0">
+                <a:latin typeface="Times New Roman" panose="02020603050405020304" pitchFamily="18" charset="0"/>
+                <a:cs typeface="Times New Roman" panose="02020603050405020304" pitchFamily="18" charset="0"/>
+              </a:rPr>
+              <a:t>");</a:t>
             </a:r>
           </a:p>
           <a:p>
@@ -10461,7 +10489,7 @@
                 <a:latin typeface="Times New Roman" panose="02020603050405020304" pitchFamily="18" charset="0"/>
                 <a:cs typeface="Times New Roman" panose="02020603050405020304" pitchFamily="18" charset="0"/>
               </a:rPr>
-              <a:t>(“</a:t>
+              <a:t>("</a:t>
             </a:r>
             <a:r>
               <a:rPr lang="en-US" sz="2400" dirty="0" err="1">
@@ -10471,30 +10499,118 @@
               <a:t>josy</a:t>
             </a:r>
             <a:r>
+              <a:rPr lang="en-US" sz="2400" b="1" dirty="0">
+                <a:latin typeface="Times New Roman" panose="02020603050405020304" pitchFamily="18" charset="0"/>
+                <a:cs typeface="Times New Roman" panose="02020603050405020304" pitchFamily="18" charset="0"/>
+              </a:rPr>
+              <a:t>\n</a:t>
+            </a:r>
+            <a:r>
               <a:rPr lang="en-US" sz="2400" dirty="0">
                 <a:latin typeface="Times New Roman" panose="02020603050405020304" pitchFamily="18" charset="0"/>
                 <a:cs typeface="Times New Roman" panose="02020603050405020304" pitchFamily="18" charset="0"/>
               </a:rPr>
-              <a:t>\n");</a:t>
-            </a:r>
-            <a:endParaRPr lang="pt-BR" sz="2400" dirty="0">
+              <a:t>");</a:t>
+            </a:r>
+          </a:p>
+          <a:p>
+            <a:pPr marL="0" lvl="1" indent="0" algn="just">
+              <a:buNone/>
+            </a:pPr>
+            <a:r>
+              <a:rPr lang="en-US" sz="2400" dirty="0" err="1">
+                <a:latin typeface="Times New Roman" panose="02020603050405020304" pitchFamily="18" charset="0"/>
+                <a:cs typeface="Times New Roman" panose="02020603050405020304" pitchFamily="18" charset="0"/>
+              </a:rPr>
+              <a:t>f.close</a:t>
+            </a:r>
+            <a:r>
+              <a:rPr lang="en-US" sz="2400" dirty="0">
+                <a:latin typeface="Times New Roman" panose="02020603050405020304" pitchFamily="18" charset="0"/>
+                <a:cs typeface="Times New Roman" panose="02020603050405020304" pitchFamily="18" charset="0"/>
+              </a:rPr>
+              <a:t>();</a:t>
+            </a:r>
+          </a:p>
+          <a:p>
+            <a:pPr marL="0" lvl="1" indent="0" algn="just">
+              <a:buNone/>
+            </a:pPr>
+            <a:r>
+              <a:rPr lang="en-US" sz="2400" b="1" dirty="0">
+                <a:solidFill>
+                  <a:srgbClr val="FF0000"/>
+                </a:solidFill>
+                <a:latin typeface="Times New Roman" panose="02020603050405020304" pitchFamily="18" charset="0"/>
+                <a:cs typeface="Times New Roman" panose="02020603050405020304" pitchFamily="18" charset="0"/>
+              </a:rPr>
+              <a:t> </a:t>
+            </a:r>
+            <a:r>
+              <a:rPr lang="en-US" sz="2400" dirty="0">
+                <a:latin typeface="Times New Roman" panose="02020603050405020304" pitchFamily="18" charset="0"/>
+                <a:cs typeface="Times New Roman" panose="02020603050405020304" pitchFamily="18" charset="0"/>
+              </a:rPr>
+              <a:t>f = </a:t>
+            </a:r>
+            <a:r>
+              <a:rPr lang="en-US" sz="2400" b="1" dirty="0">
+                <a:latin typeface="Times New Roman" panose="02020603050405020304" pitchFamily="18" charset="0"/>
+                <a:cs typeface="Times New Roman" panose="02020603050405020304" pitchFamily="18" charset="0"/>
+              </a:rPr>
+              <a:t>open</a:t>
+            </a:r>
+            <a:r>
+              <a:rPr lang="en-US" sz="2400" dirty="0">
+                <a:latin typeface="Times New Roman" panose="02020603050405020304" pitchFamily="18" charset="0"/>
+                <a:cs typeface="Times New Roman" panose="02020603050405020304" pitchFamily="18" charset="0"/>
+              </a:rPr>
+              <a:t>("f://listaNiver.txt", "r");</a:t>
+            </a:r>
+            <a:endParaRPr lang="en-US" sz="2400" b="1" dirty="0">
               <a:latin typeface="Times New Roman" panose="02020603050405020304" pitchFamily="18" charset="0"/>
               <a:cs typeface="Times New Roman" panose="02020603050405020304" pitchFamily="18" charset="0"/>
             </a:endParaRPr>
           </a:p>
           <a:p>
-            <a:pPr marL="0" indent="0" algn="just">
+            <a:pPr marL="0" lvl="1" indent="0" algn="just">
               <a:buNone/>
             </a:pPr>
-            <a:endParaRPr lang="en-US" sz="2400" dirty="0">
-              <a:latin typeface="Times New Roman" panose="02020603050405020304" pitchFamily="18" charset="0"/>
-              <a:cs typeface="Times New Roman" panose="02020603050405020304" pitchFamily="18" charset="0"/>
-            </a:endParaRPr>
-          </a:p>
-          <a:p>
-            <a:pPr marL="0" indent="0" algn="just">
-              <a:buNone/>
-            </a:pPr>
+            <a:r>
+              <a:rPr lang="en-US" sz="2400" b="1" dirty="0">
+                <a:latin typeface="Times New Roman" panose="02020603050405020304" pitchFamily="18" charset="0"/>
+                <a:cs typeface="Times New Roman" panose="02020603050405020304" pitchFamily="18" charset="0"/>
+              </a:rPr>
+              <a:t> </a:t>
+            </a:r>
+            <a:r>
+              <a:rPr lang="en-US" sz="2400" dirty="0" err="1">
+                <a:latin typeface="Times New Roman" panose="02020603050405020304" pitchFamily="18" charset="0"/>
+                <a:cs typeface="Times New Roman" panose="02020603050405020304" pitchFamily="18" charset="0"/>
+              </a:rPr>
+              <a:t>lista</a:t>
+            </a:r>
+            <a:r>
+              <a:rPr lang="en-US" sz="2400" b="1" dirty="0">
+                <a:latin typeface="Times New Roman" panose="02020603050405020304" pitchFamily="18" charset="0"/>
+                <a:cs typeface="Times New Roman" panose="02020603050405020304" pitchFamily="18" charset="0"/>
+              </a:rPr>
+              <a:t> = </a:t>
+            </a:r>
+            <a:r>
+              <a:rPr lang="en-US" sz="2400" b="1" dirty="0" err="1">
+                <a:latin typeface="Times New Roman" panose="02020603050405020304" pitchFamily="18" charset="0"/>
+                <a:cs typeface="Times New Roman" panose="02020603050405020304" pitchFamily="18" charset="0"/>
+              </a:rPr>
+              <a:t>f.read</a:t>
+            </a:r>
+            <a:r>
+              <a:rPr lang="en-US" sz="2400" b="1" dirty="0">
+                <a:latin typeface="Times New Roman" panose="02020603050405020304" pitchFamily="18" charset="0"/>
+                <a:cs typeface="Times New Roman" panose="02020603050405020304" pitchFamily="18" charset="0"/>
+              </a:rPr>
+              <a:t>().split('\n');</a:t>
+            </a:r>
             <a:endParaRPr lang="pt-BR" sz="2400" dirty="0">
               <a:latin typeface="Times New Roman" panose="02020603050405020304" pitchFamily="18" charset="0"/>
               <a:cs typeface="Times New Roman" panose="02020603050405020304" pitchFamily="18" charset="0"/>
@@ -10593,7 +10709,7 @@
               <a:buNone/>
             </a:pPr>
             <a:r>
-              <a:rPr lang="en-US" sz="2400" b="1" dirty="0" err="1">
+              <a:rPr lang="en-US" sz="2000" b="1" dirty="0" err="1">
                 <a:solidFill>
                   <a:srgbClr val="FF0000"/>
                 </a:solidFill>
@@ -10603,7 +10719,7 @@
               <a:t>Exemplo</a:t>
             </a:r>
             <a:r>
-              <a:rPr lang="en-US" sz="2400" b="1" dirty="0">
+              <a:rPr lang="en-US" sz="2000" b="1" dirty="0">
                 <a:solidFill>
                   <a:srgbClr val="FF0000"/>
                 </a:solidFill>
@@ -10614,65 +10730,82 @@
             </a:r>
           </a:p>
           <a:p>
-            <a:pPr marL="443865" lvl="2" indent="0" algn="just">
+            <a:pPr marL="0" lvl="1" indent="0" algn="just">
               <a:buNone/>
             </a:pPr>
             <a:r>
-              <a:rPr lang="en-US" sz="2400" dirty="0" err="1">
+              <a:rPr lang="en-US" sz="2000" b="1" dirty="0">
+                <a:solidFill>
+                  <a:srgbClr val="FF0000"/>
+                </a:solidFill>
+                <a:latin typeface="Times New Roman" panose="02020603050405020304" pitchFamily="18" charset="0"/>
+                <a:cs typeface="Times New Roman" panose="02020603050405020304" pitchFamily="18" charset="0"/>
+              </a:rPr>
+              <a:t>     </a:t>
+            </a:r>
+            <a:r>
+              <a:rPr lang="en-US" sz="2000" dirty="0" err="1">
                 <a:latin typeface="Times New Roman" panose="02020603050405020304" pitchFamily="18" charset="0"/>
                 <a:cs typeface="Times New Roman" panose="02020603050405020304" pitchFamily="18" charset="0"/>
               </a:rPr>
               <a:t>text_file</a:t>
             </a:r>
             <a:r>
-              <a:rPr lang="en-US" sz="2400" dirty="0">
+              <a:rPr lang="en-US" sz="2000" dirty="0">
                 <a:latin typeface="Times New Roman" panose="02020603050405020304" pitchFamily="18" charset="0"/>
                 <a:cs typeface="Times New Roman" panose="02020603050405020304" pitchFamily="18" charset="0"/>
               </a:rPr>
               <a:t> = </a:t>
             </a:r>
             <a:r>
-              <a:rPr lang="en-US" sz="2400" b="1" dirty="0">
+              <a:rPr lang="en-US" sz="2000" b="1" dirty="0">
                 <a:latin typeface="Times New Roman" panose="02020603050405020304" pitchFamily="18" charset="0"/>
                 <a:cs typeface="Times New Roman" panose="02020603050405020304" pitchFamily="18" charset="0"/>
               </a:rPr>
               <a:t>open</a:t>
             </a:r>
             <a:r>
-              <a:rPr lang="en-US" sz="2400" dirty="0">
-                <a:latin typeface="Times New Roman" panose="02020603050405020304" pitchFamily="18" charset="0"/>
-                <a:cs typeface="Times New Roman" panose="02020603050405020304" pitchFamily="18" charset="0"/>
-              </a:rPr>
-              <a:t>("f://listaNiver.txt“, "r");</a:t>
-            </a:r>
-          </a:p>
-          <a:p>
-            <a:pPr marL="443865" lvl="2" indent="0" algn="just">
+              <a:rPr lang="en-US" sz="2000" dirty="0">
+                <a:latin typeface="Times New Roman" panose="02020603050405020304" pitchFamily="18" charset="0"/>
+                <a:cs typeface="Times New Roman" panose="02020603050405020304" pitchFamily="18" charset="0"/>
+              </a:rPr>
+              <a:t>("f://listaNiver.txt", "r");</a:t>
+            </a:r>
+          </a:p>
+          <a:p>
+            <a:pPr marL="0" indent="0" algn="just">
               <a:buNone/>
             </a:pPr>
             <a:r>
-              <a:rPr lang="en-US" sz="2400" b="1" dirty="0" err="1">
+              <a:rPr lang="en-US" sz="2000" b="1" dirty="0">
+                <a:latin typeface="Times New Roman" panose="02020603050405020304" pitchFamily="18" charset="0"/>
+                <a:cs typeface="Times New Roman" panose="02020603050405020304" pitchFamily="18" charset="0"/>
+              </a:rPr>
+              <a:t>     </a:t>
+            </a:r>
+            <a:r>
+              <a:rPr lang="en-US" sz="2000" b="1" dirty="0" err="1">
                 <a:latin typeface="Times New Roman" panose="02020603050405020304" pitchFamily="18" charset="0"/>
                 <a:cs typeface="Times New Roman" panose="02020603050405020304" pitchFamily="18" charset="0"/>
               </a:rPr>
               <a:t>lista</a:t>
             </a:r>
             <a:r>
-              <a:rPr lang="en-US" sz="2400" dirty="0">
+              <a:rPr lang="en-US" sz="2000" dirty="0">
                 <a:latin typeface="Times New Roman" panose="02020603050405020304" pitchFamily="18" charset="0"/>
                 <a:cs typeface="Times New Roman" panose="02020603050405020304" pitchFamily="18" charset="0"/>
               </a:rPr>
               <a:t> = </a:t>
             </a:r>
             <a:r>
-              <a:rPr lang="en-US" sz="2400" dirty="0" err="1">
+              <a:rPr lang="en-US" sz="2000" dirty="0" err="1">
                 <a:latin typeface="Times New Roman" panose="02020603050405020304" pitchFamily="18" charset="0"/>
                 <a:cs typeface="Times New Roman" panose="02020603050405020304" pitchFamily="18" charset="0"/>
               </a:rPr>
               <a:t>text_file.</a:t>
             </a:r>
             <a:r>
-              <a:rPr lang="en-US" sz="2400" b="1" dirty="0" err="1">
+              <a:rPr lang="en-US" sz="2000" b="1" dirty="0" err="1">
                 <a:solidFill>
                   <a:srgbClr val="FF0000"/>
                 </a:solidFill>
@@ -10682,32 +10815,185 @@
               <a:t>read</a:t>
             </a:r>
             <a:r>
-              <a:rPr lang="en-US" sz="2400" dirty="0">
+              <a:rPr lang="en-US" sz="2000" dirty="0">
                 <a:latin typeface="Times New Roman" panose="02020603050405020304" pitchFamily="18" charset="0"/>
                 <a:cs typeface="Times New Roman" panose="02020603050405020304" pitchFamily="18" charset="0"/>
               </a:rPr>
               <a:t>().</a:t>
             </a:r>
             <a:r>
-              <a:rPr lang="en-US" sz="2400" b="1" dirty="0">
+              <a:rPr lang="en-US" sz="2000" b="1" dirty="0">
                 <a:latin typeface="Times New Roman" panose="02020603050405020304" pitchFamily="18" charset="0"/>
                 <a:cs typeface="Times New Roman" panose="02020603050405020304" pitchFamily="18" charset="0"/>
               </a:rPr>
               <a:t>split</a:t>
             </a:r>
             <a:r>
-              <a:rPr lang="en-US" sz="2400" dirty="0">
-                <a:latin typeface="Times New Roman" panose="02020603050405020304" pitchFamily="18" charset="0"/>
-                <a:cs typeface="Times New Roman" panose="02020603050405020304" pitchFamily="18" charset="0"/>
-              </a:rPr>
-              <a:t>(',’);</a:t>
+              <a:rPr lang="en-US" sz="2000" dirty="0">
+                <a:latin typeface="Times New Roman" panose="02020603050405020304" pitchFamily="18" charset="0"/>
+                <a:cs typeface="Times New Roman" panose="02020603050405020304" pitchFamily="18" charset="0"/>
+              </a:rPr>
+              <a:t>('\n');</a:t>
             </a:r>
           </a:p>
           <a:p>
             <a:pPr marL="0" indent="0" algn="just">
               <a:buNone/>
             </a:pPr>
-            <a:endParaRPr lang="en-US" sz="2400" b="1" dirty="0">
+            <a:r>
+              <a:rPr lang="en-US" sz="2000" b="1" dirty="0">
+                <a:latin typeface="Times New Roman" panose="02020603050405020304" pitchFamily="18" charset="0"/>
+                <a:cs typeface="Times New Roman" panose="02020603050405020304" pitchFamily="18" charset="0"/>
+              </a:rPr>
+              <a:t>     </a:t>
+            </a:r>
+            <a:r>
+              <a:rPr lang="en-US" sz="2000" b="1" dirty="0" err="1">
+                <a:latin typeface="Times New Roman" panose="02020603050405020304" pitchFamily="18" charset="0"/>
+                <a:cs typeface="Times New Roman" panose="02020603050405020304" pitchFamily="18" charset="0"/>
+              </a:rPr>
+              <a:t>lista</a:t>
+            </a:r>
+            <a:r>
+              <a:rPr lang="en-US" sz="2000" dirty="0">
+                <a:latin typeface="Times New Roman" panose="02020603050405020304" pitchFamily="18" charset="0"/>
+                <a:cs typeface="Times New Roman" panose="02020603050405020304" pitchFamily="18" charset="0"/>
+              </a:rPr>
+              <a:t> = </a:t>
+            </a:r>
+            <a:r>
+              <a:rPr lang="en-US" sz="2000" dirty="0" err="1">
+                <a:latin typeface="Times New Roman" panose="02020603050405020304" pitchFamily="18" charset="0"/>
+                <a:cs typeface="Times New Roman" panose="02020603050405020304" pitchFamily="18" charset="0"/>
+              </a:rPr>
+              <a:t>text_file.</a:t>
+            </a:r>
+            <a:r>
+              <a:rPr lang="en-US" sz="2000" b="1" dirty="0" err="1">
+                <a:solidFill>
+                  <a:srgbClr val="FF0000"/>
+                </a:solidFill>
+                <a:latin typeface="Times New Roman" panose="02020603050405020304" pitchFamily="18" charset="0"/>
+                <a:cs typeface="Times New Roman" panose="02020603050405020304" pitchFamily="18" charset="0"/>
+              </a:rPr>
+              <a:t>read</a:t>
+            </a:r>
+            <a:r>
+              <a:rPr lang="en-US" sz="2000" dirty="0">
+                <a:latin typeface="Times New Roman" panose="02020603050405020304" pitchFamily="18" charset="0"/>
+                <a:cs typeface="Times New Roman" panose="02020603050405020304" pitchFamily="18" charset="0"/>
+              </a:rPr>
+              <a:t>().</a:t>
+            </a:r>
+            <a:r>
+              <a:rPr lang="en-US" sz="2000" b="1" dirty="0">
+                <a:latin typeface="Times New Roman" panose="02020603050405020304" pitchFamily="18" charset="0"/>
+                <a:cs typeface="Times New Roman" panose="02020603050405020304" pitchFamily="18" charset="0"/>
+              </a:rPr>
+              <a:t>split</a:t>
+            </a:r>
+            <a:r>
+              <a:rPr lang="en-US" sz="2000" dirty="0">
+                <a:latin typeface="Times New Roman" panose="02020603050405020304" pitchFamily="18" charset="0"/>
+                <a:cs typeface="Times New Roman" panose="02020603050405020304" pitchFamily="18" charset="0"/>
+              </a:rPr>
+              <a:t>(','); </a:t>
+            </a:r>
+            <a:r>
+              <a:rPr lang="en-US" sz="1800" dirty="0">
+                <a:latin typeface="Times New Roman" panose="02020603050405020304" pitchFamily="18" charset="0"/>
+                <a:cs typeface="Times New Roman" panose="02020603050405020304" pitchFamily="18" charset="0"/>
+              </a:rPr>
+              <a:t># </a:t>
+            </a:r>
+            <a:r>
+              <a:rPr lang="en-US" sz="1800" dirty="0" err="1">
+                <a:latin typeface="Times New Roman" panose="02020603050405020304" pitchFamily="18" charset="0"/>
+                <a:cs typeface="Times New Roman" panose="02020603050405020304" pitchFamily="18" charset="0"/>
+              </a:rPr>
+              <a:t>Observar</a:t>
+            </a:r>
+            <a:r>
+              <a:rPr lang="en-US" sz="1800" dirty="0">
+                <a:latin typeface="Times New Roman" panose="02020603050405020304" pitchFamily="18" charset="0"/>
+                <a:cs typeface="Times New Roman" panose="02020603050405020304" pitchFamily="18" charset="0"/>
+              </a:rPr>
+              <a:t> o </a:t>
+            </a:r>
+            <a:r>
+              <a:rPr lang="en-US" sz="1800" dirty="0" err="1">
+                <a:latin typeface="Times New Roman" panose="02020603050405020304" pitchFamily="18" charset="0"/>
+                <a:cs typeface="Times New Roman" panose="02020603050405020304" pitchFamily="18" charset="0"/>
+              </a:rPr>
+              <a:t>separador</a:t>
+            </a:r>
+            <a:r>
+              <a:rPr lang="en-US" sz="1800" dirty="0">
+                <a:latin typeface="Times New Roman" panose="02020603050405020304" pitchFamily="18" charset="0"/>
+                <a:cs typeface="Times New Roman" panose="02020603050405020304" pitchFamily="18" charset="0"/>
+              </a:rPr>
+              <a:t> que </a:t>
+            </a:r>
+            <a:r>
+              <a:rPr lang="en-US" sz="1800" dirty="0" err="1">
+                <a:latin typeface="Times New Roman" panose="02020603050405020304" pitchFamily="18" charset="0"/>
+                <a:cs typeface="Times New Roman" panose="02020603050405020304" pitchFamily="18" charset="0"/>
+              </a:rPr>
+              <a:t>vem</a:t>
+            </a:r>
+            <a:r>
+              <a:rPr lang="en-US" sz="1800" dirty="0">
+                <a:latin typeface="Times New Roman" panose="02020603050405020304" pitchFamily="18" charset="0"/>
+                <a:cs typeface="Times New Roman" panose="02020603050405020304" pitchFamily="18" charset="0"/>
+              </a:rPr>
+              <a:t> </a:t>
+            </a:r>
+            <a:r>
+              <a:rPr lang="en-US" sz="1800" b="1" dirty="0" err="1">
+                <a:solidFill>
+                  <a:srgbClr val="FF0000"/>
+                </a:solidFill>
+                <a:latin typeface="Times New Roman" panose="02020603050405020304" pitchFamily="18" charset="0"/>
+                <a:cs typeface="Times New Roman" panose="02020603050405020304" pitchFamily="18" charset="0"/>
+              </a:rPr>
+              <a:t>dentro</a:t>
+            </a:r>
+            <a:r>
+              <a:rPr lang="en-US" sz="1800" b="1" dirty="0">
+                <a:solidFill>
+                  <a:srgbClr val="FF0000"/>
+                </a:solidFill>
+                <a:latin typeface="Times New Roman" panose="02020603050405020304" pitchFamily="18" charset="0"/>
+                <a:cs typeface="Times New Roman" panose="02020603050405020304" pitchFamily="18" charset="0"/>
+              </a:rPr>
+              <a:t> do </a:t>
+            </a:r>
+            <a:r>
+              <a:rPr lang="en-US" sz="1800" b="1" dirty="0" err="1">
+                <a:solidFill>
+                  <a:srgbClr val="FF0000"/>
+                </a:solidFill>
+                <a:latin typeface="Times New Roman" panose="02020603050405020304" pitchFamily="18" charset="0"/>
+                <a:cs typeface="Times New Roman" panose="02020603050405020304" pitchFamily="18" charset="0"/>
+              </a:rPr>
+              <a:t>arquivo</a:t>
+            </a:r>
+            <a:r>
+              <a:rPr lang="en-US" sz="1800" b="1" dirty="0">
+                <a:solidFill>
+                  <a:srgbClr val="FF0000"/>
+                </a:solidFill>
+                <a:latin typeface="Times New Roman" panose="02020603050405020304" pitchFamily="18" charset="0"/>
+                <a:cs typeface="Times New Roman" panose="02020603050405020304" pitchFamily="18" charset="0"/>
+              </a:rPr>
+              <a:t>.</a:t>
+            </a:r>
+          </a:p>
+          <a:p>
+            <a:pPr marL="0" indent="0" algn="just">
+              <a:buNone/>
+            </a:pPr>
+            <a:endParaRPr lang="en-US" sz="2000" b="1" dirty="0">
               <a:solidFill>
                 <a:srgbClr val="FF0000"/>
               </a:solidFill>
@@ -10720,7 +11006,7 @@
               <a:buNone/>
             </a:pPr>
             <a:r>
-              <a:rPr lang="en-US" sz="2400" b="1" dirty="0" err="1">
+              <a:rPr lang="en-US" sz="2000" b="1" dirty="0" err="1">
                 <a:solidFill>
                   <a:srgbClr val="FF0000"/>
                 </a:solidFill>
@@ -10730,7 +11016,7 @@
               <a:t>Exemplo</a:t>
             </a:r>
             <a:r>
-              <a:rPr lang="en-US" sz="2400" b="1" dirty="0">
+              <a:rPr lang="en-US" sz="2000" b="1" dirty="0">
                 <a:solidFill>
                   <a:srgbClr val="FF0000"/>
                 </a:solidFill>
@@ -10745,28 +11031,28 @@
               <a:buNone/>
             </a:pPr>
             <a:r>
-              <a:rPr lang="en-US" sz="2400" dirty="0" err="1">
+              <a:rPr lang="en-US" sz="2000" dirty="0" err="1">
                 <a:latin typeface="Times New Roman" panose="02020603050405020304" pitchFamily="18" charset="0"/>
                 <a:cs typeface="Times New Roman" panose="02020603050405020304" pitchFamily="18" charset="0"/>
               </a:rPr>
               <a:t>text_file</a:t>
             </a:r>
             <a:r>
-              <a:rPr lang="pt-BR" sz="2400" dirty="0">
+              <a:rPr lang="pt-BR" sz="2000" dirty="0">
                 <a:latin typeface="Times New Roman" panose="02020603050405020304" pitchFamily="18" charset="0"/>
                 <a:cs typeface="Times New Roman" panose="02020603050405020304" pitchFamily="18" charset="0"/>
               </a:rPr>
               <a:t> = </a:t>
             </a:r>
             <a:r>
-              <a:rPr lang="pt-BR" sz="2400" b="1" dirty="0">
+              <a:rPr lang="pt-BR" sz="2000" b="1" dirty="0">
                 <a:latin typeface="Times New Roman" panose="02020603050405020304" pitchFamily="18" charset="0"/>
                 <a:cs typeface="Times New Roman" panose="02020603050405020304" pitchFamily="18" charset="0"/>
               </a:rPr>
               <a:t>open</a:t>
             </a:r>
             <a:r>
-              <a:rPr lang="pt-BR" sz="2400" dirty="0">
+              <a:rPr lang="pt-BR" sz="2000" dirty="0">
                 <a:latin typeface="Times New Roman" panose="02020603050405020304" pitchFamily="18" charset="0"/>
                 <a:cs typeface="Times New Roman" panose="02020603050405020304" pitchFamily="18" charset="0"/>
               </a:rPr>
@@ -10778,42 +11064,42 @@
               <a:buNone/>
             </a:pPr>
             <a:r>
-              <a:rPr lang="pt-BR" sz="2400" b="1" dirty="0">
+              <a:rPr lang="pt-BR" sz="2000" b="1" dirty="0">
                 <a:latin typeface="Times New Roman" panose="02020603050405020304" pitchFamily="18" charset="0"/>
                 <a:cs typeface="Times New Roman" panose="02020603050405020304" pitchFamily="18" charset="0"/>
               </a:rPr>
               <a:t>for</a:t>
             </a:r>
             <a:r>
-              <a:rPr lang="pt-BR" sz="2400" dirty="0">
+              <a:rPr lang="pt-BR" sz="2000" dirty="0">
                 <a:latin typeface="Times New Roman" panose="02020603050405020304" pitchFamily="18" charset="0"/>
                 <a:cs typeface="Times New Roman" panose="02020603050405020304" pitchFamily="18" charset="0"/>
               </a:rPr>
               <a:t> registro </a:t>
             </a:r>
             <a:r>
-              <a:rPr lang="pt-BR" sz="2400" b="1" dirty="0">
+              <a:rPr lang="pt-BR" sz="2000" b="1" dirty="0">
                 <a:latin typeface="Times New Roman" panose="02020603050405020304" pitchFamily="18" charset="0"/>
                 <a:cs typeface="Times New Roman" panose="02020603050405020304" pitchFamily="18" charset="0"/>
               </a:rPr>
               <a:t>in</a:t>
             </a:r>
             <a:r>
-              <a:rPr lang="pt-BR" sz="2400" dirty="0">
+              <a:rPr lang="pt-BR" sz="2000" dirty="0">
                 <a:latin typeface="Times New Roman" panose="02020603050405020304" pitchFamily="18" charset="0"/>
                 <a:cs typeface="Times New Roman" panose="02020603050405020304" pitchFamily="18" charset="0"/>
               </a:rPr>
               <a:t> </a:t>
             </a:r>
             <a:r>
-              <a:rPr lang="en-US" sz="2400" dirty="0" err="1">
+              <a:rPr lang="en-US" sz="2000" dirty="0" err="1">
                 <a:latin typeface="Times New Roman" panose="02020603050405020304" pitchFamily="18" charset="0"/>
                 <a:cs typeface="Times New Roman" panose="02020603050405020304" pitchFamily="18" charset="0"/>
               </a:rPr>
               <a:t>text_file</a:t>
             </a:r>
             <a:r>
-              <a:rPr lang="pt-BR" sz="2400" dirty="0">
+              <a:rPr lang="pt-BR" sz="2000" dirty="0">
                 <a:latin typeface="Times New Roman" panose="02020603050405020304" pitchFamily="18" charset="0"/>
                 <a:cs typeface="Times New Roman" panose="02020603050405020304" pitchFamily="18" charset="0"/>
               </a:rPr>
@@ -10825,21 +11111,21 @@
               <a:buNone/>
             </a:pPr>
             <a:r>
-              <a:rPr lang="pt-BR" sz="2400" dirty="0">
+              <a:rPr lang="pt-BR" sz="2000" dirty="0">
                 <a:latin typeface="Times New Roman" panose="02020603050405020304" pitchFamily="18" charset="0"/>
                 <a:cs typeface="Times New Roman" panose="02020603050405020304" pitchFamily="18" charset="0"/>
               </a:rPr>
               <a:t>    </a:t>
             </a:r>
             <a:r>
-              <a:rPr lang="pt-BR" sz="2400" b="1" dirty="0">
+              <a:rPr lang="pt-BR" sz="2000" b="1" dirty="0">
                 <a:latin typeface="Times New Roman" panose="02020603050405020304" pitchFamily="18" charset="0"/>
                 <a:cs typeface="Times New Roman" panose="02020603050405020304" pitchFamily="18" charset="0"/>
               </a:rPr>
               <a:t>print</a:t>
             </a:r>
             <a:r>
-              <a:rPr lang="pt-BR" sz="2400" dirty="0">
+              <a:rPr lang="pt-BR" sz="2000" dirty="0">
                 <a:latin typeface="Times New Roman" panose="02020603050405020304" pitchFamily="18" charset="0"/>
                 <a:cs typeface="Times New Roman" panose="02020603050405020304" pitchFamily="18" charset="0"/>
               </a:rPr>

</xml_diff>